<commit_message>
file deletions to rerun results
</commit_message>
<xml_diff>
--- a/tuna_figures_27_Nov_19.pptx
+++ b/tuna_figures_27_Nov_19.pptx
@@ -9,9 +9,11 @@
     <p:sldId id="257" r:id="rId3"/>
     <p:sldId id="256" r:id="rId4"/>
     <p:sldId id="259" r:id="rId5"/>
-    <p:sldId id="260" r:id="rId6"/>
-    <p:sldId id="261" r:id="rId7"/>
-    <p:sldId id="262" r:id="rId8"/>
+    <p:sldId id="261" r:id="rId6"/>
+    <p:sldId id="263" r:id="rId7"/>
+    <p:sldId id="264" r:id="rId8"/>
+    <p:sldId id="265" r:id="rId9"/>
+    <p:sldId id="262" r:id="rId10"/>
   </p:sldIdLst>
   <p:sldSz cx="7772400" cy="10058400"/>
   <p:notesSz cx="6858000" cy="9144000"/>
@@ -249,7 +251,7 @@
           <a:p>
             <a:fld id="{1E7E883B-11B2-F546-8BE1-5EA8FE305874}" type="datetimeFigureOut">
               <a:rPr lang="en-US" smtClean="0"/>
-              <a:t>12/3/19</a:t>
+              <a:t>12/6/19</a:t>
             </a:fld>
             <a:endParaRPr lang="en-US"/>
           </a:p>
@@ -419,7 +421,7 @@
           <a:p>
             <a:fld id="{1E7E883B-11B2-F546-8BE1-5EA8FE305874}" type="datetimeFigureOut">
               <a:rPr lang="en-US" smtClean="0"/>
-              <a:t>12/3/19</a:t>
+              <a:t>12/6/19</a:t>
             </a:fld>
             <a:endParaRPr lang="en-US"/>
           </a:p>
@@ -599,7 +601,7 @@
           <a:p>
             <a:fld id="{1E7E883B-11B2-F546-8BE1-5EA8FE305874}" type="datetimeFigureOut">
               <a:rPr lang="en-US" smtClean="0"/>
-              <a:t>12/3/19</a:t>
+              <a:t>12/6/19</a:t>
             </a:fld>
             <a:endParaRPr lang="en-US"/>
           </a:p>
@@ -769,7 +771,7 @@
           <a:p>
             <a:fld id="{1E7E883B-11B2-F546-8BE1-5EA8FE305874}" type="datetimeFigureOut">
               <a:rPr lang="en-US" smtClean="0"/>
-              <a:t>12/3/19</a:t>
+              <a:t>12/6/19</a:t>
             </a:fld>
             <a:endParaRPr lang="en-US"/>
           </a:p>
@@ -1013,7 +1015,7 @@
           <a:p>
             <a:fld id="{1E7E883B-11B2-F546-8BE1-5EA8FE305874}" type="datetimeFigureOut">
               <a:rPr lang="en-US" smtClean="0"/>
-              <a:t>12/3/19</a:t>
+              <a:t>12/6/19</a:t>
             </a:fld>
             <a:endParaRPr lang="en-US"/>
           </a:p>
@@ -1245,7 +1247,7 @@
           <a:p>
             <a:fld id="{1E7E883B-11B2-F546-8BE1-5EA8FE305874}" type="datetimeFigureOut">
               <a:rPr lang="en-US" smtClean="0"/>
-              <a:t>12/3/19</a:t>
+              <a:t>12/6/19</a:t>
             </a:fld>
             <a:endParaRPr lang="en-US"/>
           </a:p>
@@ -1612,7 +1614,7 @@
           <a:p>
             <a:fld id="{1E7E883B-11B2-F546-8BE1-5EA8FE305874}" type="datetimeFigureOut">
               <a:rPr lang="en-US" smtClean="0"/>
-              <a:t>12/3/19</a:t>
+              <a:t>12/6/19</a:t>
             </a:fld>
             <a:endParaRPr lang="en-US"/>
           </a:p>
@@ -1730,7 +1732,7 @@
           <a:p>
             <a:fld id="{1E7E883B-11B2-F546-8BE1-5EA8FE305874}" type="datetimeFigureOut">
               <a:rPr lang="en-US" smtClean="0"/>
-              <a:t>12/3/19</a:t>
+              <a:t>12/6/19</a:t>
             </a:fld>
             <a:endParaRPr lang="en-US"/>
           </a:p>
@@ -1825,7 +1827,7 @@
           <a:p>
             <a:fld id="{1E7E883B-11B2-F546-8BE1-5EA8FE305874}" type="datetimeFigureOut">
               <a:rPr lang="en-US" smtClean="0"/>
-              <a:t>12/3/19</a:t>
+              <a:t>12/6/19</a:t>
             </a:fld>
             <a:endParaRPr lang="en-US"/>
           </a:p>
@@ -2102,7 +2104,7 @@
           <a:p>
             <a:fld id="{1E7E883B-11B2-F546-8BE1-5EA8FE305874}" type="datetimeFigureOut">
               <a:rPr lang="en-US" smtClean="0"/>
-              <a:t>12/3/19</a:t>
+              <a:t>12/6/19</a:t>
             </a:fld>
             <a:endParaRPr lang="en-US"/>
           </a:p>
@@ -2359,7 +2361,7 @@
           <a:p>
             <a:fld id="{1E7E883B-11B2-F546-8BE1-5EA8FE305874}" type="datetimeFigureOut">
               <a:rPr lang="en-US" smtClean="0"/>
-              <a:t>12/3/19</a:t>
+              <a:t>12/6/19</a:t>
             </a:fld>
             <a:endParaRPr lang="en-US"/>
           </a:p>
@@ -2572,7 +2574,7 @@
           <a:p>
             <a:fld id="{1E7E883B-11B2-F546-8BE1-5EA8FE305874}" type="datetimeFigureOut">
               <a:rPr lang="en-US" smtClean="0"/>
-              <a:t>12/3/19</a:t>
+              <a:t>12/6/19</a:t>
             </a:fld>
             <a:endParaRPr lang="en-US"/>
           </a:p>
@@ -4831,12 +4833,54 @@
           <a:chExt cx="0" cy="0"/>
         </a:xfrm>
       </p:grpSpPr>
+      <p:sp>
+        <p:nvSpPr>
+          <p:cNvPr id="5" name="TextBox 4">
+            <a:extLst>
+              <a:ext uri="{FF2B5EF4-FFF2-40B4-BE49-F238E27FC236}">
+                <a16:creationId xmlns:a16="http://schemas.microsoft.com/office/drawing/2014/main" id="{523D29D5-A26C-DF4A-96E4-20B67A817AF8}"/>
+              </a:ext>
+            </a:extLst>
+          </p:cNvPr>
+          <p:cNvSpPr txBox="1"/>
+          <p:nvPr/>
+        </p:nvSpPr>
+        <p:spPr>
+          <a:xfrm>
+            <a:off x="996462" y="1518046"/>
+            <a:ext cx="2889738" cy="523220"/>
+          </a:xfrm>
+          <a:prstGeom prst="rect">
+            <a:avLst/>
+          </a:prstGeom>
+          <a:noFill/>
+        </p:spPr>
+        <p:txBody>
+          <a:bodyPr wrap="square" rtlCol="0">
+            <a:spAutoFit/>
+          </a:bodyPr>
+          <a:lstStyle/>
+          <a:p>
+            <a:pPr algn="ctr"/>
+            <a:r>
+              <a:rPr lang="en-US" sz="1400" b="1" dirty="0">
+                <a:solidFill>
+                  <a:srgbClr val="374BC1"/>
+                </a:solidFill>
+                <a:latin typeface="Arial" panose="020B0604020202020204" pitchFamily="34" charset="0"/>
+                <a:cs typeface="Arial" panose="020B0604020202020204" pitchFamily="34" charset="0"/>
+              </a:rPr>
+              <a:t>Reproductive output limited to 20% of structural mass</a:t>
+            </a:r>
+          </a:p>
+        </p:txBody>
+      </p:sp>
       <p:pic>
         <p:nvPicPr>
-          <p:cNvPr id="2" name="Picture 1">
+          <p:cNvPr id="6" name="Picture 5">
             <a:extLst>
               <a:ext uri="{FF2B5EF4-FFF2-40B4-BE49-F238E27FC236}">
-                <a16:creationId xmlns:a16="http://schemas.microsoft.com/office/drawing/2014/main" id="{1F2A1FCF-F21D-4349-B2A7-5A985D6E3505}"/>
+                <a16:creationId xmlns:a16="http://schemas.microsoft.com/office/drawing/2014/main" id="{30533696-DF56-8447-A24F-4367CADA0E7B}"/>
               </a:ext>
             </a:extLst>
           </p:cNvPr>
@@ -4853,8 +4897,8 @@
         </p:blipFill>
         <p:spPr>
           <a:xfrm>
-            <a:off x="452317" y="1828800"/>
-            <a:ext cx="3022600" cy="6400800"/>
+            <a:off x="685800" y="1828800"/>
+            <a:ext cx="6400800" cy="6400800"/>
           </a:xfrm>
           <a:prstGeom prst="rect">
             <a:avLst/>
@@ -4863,10 +4907,10 @@
       </p:pic>
       <p:sp>
         <p:nvSpPr>
-          <p:cNvPr id="3" name="TextBox 2">
+          <p:cNvPr id="7" name="TextBox 6">
             <a:extLst>
               <a:ext uri="{FF2B5EF4-FFF2-40B4-BE49-F238E27FC236}">
-                <a16:creationId xmlns:a16="http://schemas.microsoft.com/office/drawing/2014/main" id="{AF53003E-F3F0-764A-8988-F9E44E4CA3F7}"/>
+                <a16:creationId xmlns:a16="http://schemas.microsoft.com/office/drawing/2014/main" id="{7C323414-3E11-1C47-ADC5-7F532D6F013A}"/>
               </a:ext>
             </a:extLst>
           </p:cNvPr>
@@ -4875,8 +4919,8 @@
         </p:nvSpPr>
         <p:spPr>
           <a:xfrm>
-            <a:off x="211017" y="984738"/>
-            <a:ext cx="3657600" cy="430887"/>
+            <a:off x="4352193" y="1541492"/>
+            <a:ext cx="2889738" cy="523220"/>
           </a:xfrm>
           <a:prstGeom prst="rect">
             <a:avLst/>
@@ -4889,56 +4933,26 @@
           </a:bodyPr>
           <a:lstStyle/>
           <a:p>
-            <a:pPr algn="l"/>
-            <a:r>
-              <a:rPr lang="en-US" sz="1100" b="1" dirty="0">
+            <a:pPr algn="ctr"/>
+            <a:r>
+              <a:rPr lang="en-US" sz="1400" b="1" dirty="0">
                 <a:solidFill>
                   <a:srgbClr val="374BC1"/>
                 </a:solidFill>
                 <a:latin typeface="Arial" panose="020B0604020202020204" pitchFamily="34" charset="0"/>
                 <a:cs typeface="Arial" panose="020B0604020202020204" pitchFamily="34" charset="0"/>
               </a:rPr>
-              <a:t>Mortality rate calculation. Need to fix Y axis and explain the rate is the absolute value of the slope. </a:t>
-            </a:r>
-          </a:p>
-        </p:txBody>
-      </p:sp>
-      <p:pic>
-        <p:nvPicPr>
-          <p:cNvPr id="4" name="Picture 3">
+              <a:t>Reproductive output limited to 30% of structural mass</a:t>
+            </a:r>
+          </a:p>
+        </p:txBody>
+      </p:sp>
+      <p:sp>
+        <p:nvSpPr>
+          <p:cNvPr id="8" name="TextBox 7">
             <a:extLst>
               <a:ext uri="{FF2B5EF4-FFF2-40B4-BE49-F238E27FC236}">
-                <a16:creationId xmlns:a16="http://schemas.microsoft.com/office/drawing/2014/main" id="{52F5A8D9-44BD-EE4A-BCDB-CCFEADBB3695}"/>
-              </a:ext>
-            </a:extLst>
-          </p:cNvPr>
-          <p:cNvPicPr>
-            <a:picLocks noChangeAspect="1"/>
-          </p:cNvPicPr>
-          <p:nvPr/>
-        </p:nvPicPr>
-        <p:blipFill>
-          <a:blip r:embed="rId3"/>
-          <a:stretch>
-            <a:fillRect/>
-          </a:stretch>
-        </p:blipFill>
-        <p:spPr>
-          <a:xfrm>
-            <a:off x="4038600" y="1863969"/>
-            <a:ext cx="3048000" cy="6400800"/>
-          </a:xfrm>
-          <a:prstGeom prst="rect">
-            <a:avLst/>
-          </a:prstGeom>
-        </p:spPr>
-      </p:pic>
-      <p:sp>
-        <p:nvSpPr>
-          <p:cNvPr id="5" name="TextBox 4">
-            <a:extLst>
-              <a:ext uri="{FF2B5EF4-FFF2-40B4-BE49-F238E27FC236}">
-                <a16:creationId xmlns:a16="http://schemas.microsoft.com/office/drawing/2014/main" id="{25F447A5-EFB6-4F4E-B8A2-50AAF0942309}"/>
+                <a16:creationId xmlns:a16="http://schemas.microsoft.com/office/drawing/2014/main" id="{1929AE40-71C0-4D46-8597-EC75F4BD33DB}"/>
               </a:ext>
             </a:extLst>
           </p:cNvPr>
@@ -4946,9 +4960,9 @@
           <p:nvPr/>
         </p:nvSpPr>
         <p:spPr>
-          <a:xfrm>
-            <a:off x="3903785" y="984738"/>
-            <a:ext cx="3657600" cy="430887"/>
+          <a:xfrm rot="16200000">
+            <a:off x="-1056589" y="3206170"/>
+            <a:ext cx="2889738" cy="307777"/>
           </a:xfrm>
           <a:prstGeom prst="rect">
             <a:avLst/>
@@ -4961,36 +4975,100 @@
           </a:bodyPr>
           <a:lstStyle/>
           <a:p>
-            <a:pPr algn="l"/>
-            <a:r>
-              <a:rPr lang="en-US" sz="1100" b="1" dirty="0">
+            <a:pPr algn="ctr"/>
+            <a:r>
+              <a:rPr lang="en-US" sz="1400" b="1" dirty="0">
                 <a:solidFill>
                   <a:srgbClr val="374BC1"/>
                 </a:solidFill>
                 <a:latin typeface="Arial" panose="020B0604020202020204" pitchFamily="34" charset="0"/>
                 <a:cs typeface="Arial" panose="020B0604020202020204" pitchFamily="34" charset="0"/>
               </a:rPr>
-              <a:t>Fecundity exponent calc. </a:t>
-            </a:r>
-            <a:r>
-              <a:rPr lang="en-US" sz="1100" b="1" dirty="0" err="1">
+              <a:t>Low food</a:t>
+            </a:r>
+          </a:p>
+        </p:txBody>
+      </p:sp>
+      <p:sp>
+        <p:nvSpPr>
+          <p:cNvPr id="9" name="TextBox 8">
+            <a:extLst>
+              <a:ext uri="{FF2B5EF4-FFF2-40B4-BE49-F238E27FC236}">
+                <a16:creationId xmlns:a16="http://schemas.microsoft.com/office/drawing/2014/main" id="{0651A953-68B1-0645-B771-D8B92296190B}"/>
+              </a:ext>
+            </a:extLst>
+          </p:cNvPr>
+          <p:cNvSpPr txBox="1"/>
+          <p:nvPr/>
+        </p:nvSpPr>
+        <p:spPr>
+          <a:xfrm rot="16200000">
+            <a:off x="-984774" y="6406572"/>
+            <a:ext cx="2889738" cy="307777"/>
+          </a:xfrm>
+          <a:prstGeom prst="rect">
+            <a:avLst/>
+          </a:prstGeom>
+          <a:noFill/>
+        </p:spPr>
+        <p:txBody>
+          <a:bodyPr wrap="square" rtlCol="0">
+            <a:spAutoFit/>
+          </a:bodyPr>
+          <a:lstStyle/>
+          <a:p>
+            <a:pPr algn="ctr"/>
+            <a:r>
+              <a:rPr lang="en-US" sz="1400" b="1" dirty="0">
                 <a:solidFill>
                   <a:srgbClr val="374BC1"/>
                 </a:solidFill>
                 <a:latin typeface="Arial" panose="020B0604020202020204" pitchFamily="34" charset="0"/>
                 <a:cs typeface="Arial" panose="020B0604020202020204" pitchFamily="34" charset="0"/>
               </a:rPr>
-              <a:t>Rlim</a:t>
-            </a:r>
-            <a:r>
-              <a:rPr lang="en-US" sz="1100" b="1" dirty="0">
+              <a:t>High food</a:t>
+            </a:r>
+          </a:p>
+        </p:txBody>
+      </p:sp>
+      <p:sp>
+        <p:nvSpPr>
+          <p:cNvPr id="10" name="TextBox 9">
+            <a:extLst>
+              <a:ext uri="{FF2B5EF4-FFF2-40B4-BE49-F238E27FC236}">
+                <a16:creationId xmlns:a16="http://schemas.microsoft.com/office/drawing/2014/main" id="{49C6FD7D-F43E-5545-83EE-43F39DDEE807}"/>
+              </a:ext>
+            </a:extLst>
+          </p:cNvPr>
+          <p:cNvSpPr txBox="1"/>
+          <p:nvPr/>
+        </p:nvSpPr>
+        <p:spPr>
+          <a:xfrm>
+            <a:off x="1688122" y="679938"/>
+            <a:ext cx="4630616" cy="369332"/>
+          </a:xfrm>
+          <a:prstGeom prst="rect">
+            <a:avLst/>
+          </a:prstGeom>
+          <a:noFill/>
+        </p:spPr>
+        <p:txBody>
+          <a:bodyPr wrap="square" rtlCol="0">
+            <a:spAutoFit/>
+          </a:bodyPr>
+          <a:lstStyle/>
+          <a:p>
+            <a:pPr algn="ctr"/>
+            <a:r>
+              <a:rPr lang="en-US" b="1" dirty="0">
                 <a:solidFill>
                   <a:srgbClr val="374BC1"/>
                 </a:solidFill>
                 <a:latin typeface="Arial" panose="020B0604020202020204" pitchFamily="34" charset="0"/>
                 <a:cs typeface="Arial" panose="020B0604020202020204" pitchFamily="34" charset="0"/>
               </a:rPr>
-              <a:t> = 0.2 (top), 0.3 (middle), 0.4 (down)</a:t>
+              <a:t>Reproductive limit sensitivity: LENGTH</a:t>
             </a:r>
           </a:p>
         </p:txBody>
@@ -4998,7 +5076,7 @@
     </p:spTree>
     <p:extLst>
       <p:ext uri="{BB962C8B-B14F-4D97-AF65-F5344CB8AC3E}">
-        <p14:creationId xmlns:p14="http://schemas.microsoft.com/office/powerpoint/2010/main" val="893644881"/>
+        <p14:creationId xmlns:p14="http://schemas.microsoft.com/office/powerpoint/2010/main" val="2883174855"/>
       </p:ext>
     </p:extLst>
   </p:cSld>
@@ -5030,7 +5108,7 @@
           <p:cNvPr id="2" name="Picture 1">
             <a:extLst>
               <a:ext uri="{FF2B5EF4-FFF2-40B4-BE49-F238E27FC236}">
-                <a16:creationId xmlns:a16="http://schemas.microsoft.com/office/drawing/2014/main" id="{0342C2A4-435C-CF44-BACE-6CE47A29B4AA}"/>
+                <a16:creationId xmlns:a16="http://schemas.microsoft.com/office/drawing/2014/main" id="{D9E168F8-8BF4-DA4C-A70A-2BE03D51939A}"/>
               </a:ext>
             </a:extLst>
           </p:cNvPr>
@@ -5047,8 +5125,8 @@
         </p:blipFill>
         <p:spPr>
           <a:xfrm>
-            <a:off x="4273062" y="1828800"/>
-            <a:ext cx="3048000" cy="6400800"/>
+            <a:off x="685800" y="1828800"/>
+            <a:ext cx="6400800" cy="6400800"/>
           </a:xfrm>
           <a:prstGeom prst="rect">
             <a:avLst/>
@@ -5060,7 +5138,7 @@
           <p:cNvPr id="3" name="TextBox 2">
             <a:extLst>
               <a:ext uri="{FF2B5EF4-FFF2-40B4-BE49-F238E27FC236}">
-                <a16:creationId xmlns:a16="http://schemas.microsoft.com/office/drawing/2014/main" id="{1EEC13C4-8D49-7049-843D-907AB46FD7C6}"/>
+                <a16:creationId xmlns:a16="http://schemas.microsoft.com/office/drawing/2014/main" id="{FC3AE2EE-67FE-8541-92F1-37512BAF4B09}"/>
               </a:ext>
             </a:extLst>
           </p:cNvPr>
@@ -5069,8 +5147,8 @@
         </p:nvSpPr>
         <p:spPr>
           <a:xfrm>
-            <a:off x="4536833" y="1521023"/>
-            <a:ext cx="2889738" cy="307777"/>
+            <a:off x="996462" y="1518046"/>
+            <a:ext cx="2889738" cy="523220"/>
           </a:xfrm>
           <a:prstGeom prst="rect">
             <a:avLst/>
@@ -5083,7 +5161,7 @@
           </a:bodyPr>
           <a:lstStyle/>
           <a:p>
-            <a:pPr algn="l"/>
+            <a:pPr algn="ctr"/>
             <a:r>
               <a:rPr lang="en-US" sz="1400" b="1" dirty="0">
                 <a:solidFill>
@@ -5092,47 +5170,17 @@
                 <a:latin typeface="Arial" panose="020B0604020202020204" pitchFamily="34" charset="0"/>
                 <a:cs typeface="Arial" panose="020B0604020202020204" pitchFamily="34" charset="0"/>
               </a:rPr>
-              <a:t>Reproductive output over time</a:t>
-            </a:r>
-          </a:p>
-        </p:txBody>
-      </p:sp>
-      <p:pic>
-        <p:nvPicPr>
-          <p:cNvPr id="4" name="Picture 3">
+              <a:t>Reproductive output limited to 20% of structural mass</a:t>
+            </a:r>
+          </a:p>
+        </p:txBody>
+      </p:sp>
+      <p:sp>
+        <p:nvSpPr>
+          <p:cNvPr id="4" name="TextBox 3">
             <a:extLst>
               <a:ext uri="{FF2B5EF4-FFF2-40B4-BE49-F238E27FC236}">
-                <a16:creationId xmlns:a16="http://schemas.microsoft.com/office/drawing/2014/main" id="{CD5D9379-77A3-324F-A83C-B26D65685C5C}"/>
-              </a:ext>
-            </a:extLst>
-          </p:cNvPr>
-          <p:cNvPicPr>
-            <a:picLocks noChangeAspect="1"/>
-          </p:cNvPicPr>
-          <p:nvPr/>
-        </p:nvPicPr>
-        <p:blipFill>
-          <a:blip r:embed="rId3"/>
-          <a:stretch>
-            <a:fillRect/>
-          </a:stretch>
-        </p:blipFill>
-        <p:spPr>
-          <a:xfrm>
-            <a:off x="838200" y="1828800"/>
-            <a:ext cx="3048000" cy="6400800"/>
-          </a:xfrm>
-          <a:prstGeom prst="rect">
-            <a:avLst/>
-          </a:prstGeom>
-        </p:spPr>
-      </p:pic>
-      <p:sp>
-        <p:nvSpPr>
-          <p:cNvPr id="5" name="TextBox 4">
-            <a:extLst>
-              <a:ext uri="{FF2B5EF4-FFF2-40B4-BE49-F238E27FC236}">
-                <a16:creationId xmlns:a16="http://schemas.microsoft.com/office/drawing/2014/main" id="{523D29D5-A26C-DF4A-96E4-20B67A817AF8}"/>
+                <a16:creationId xmlns:a16="http://schemas.microsoft.com/office/drawing/2014/main" id="{1B2AFDC6-DC11-9144-8F37-981554ED5A46}"/>
               </a:ext>
             </a:extLst>
           </p:cNvPr>
@@ -5141,8 +5189,8 @@
         </p:nvSpPr>
         <p:spPr>
           <a:xfrm>
-            <a:off x="1189893" y="1521022"/>
-            <a:ext cx="2889738" cy="307777"/>
+            <a:off x="4352193" y="1541492"/>
+            <a:ext cx="2889738" cy="523220"/>
           </a:xfrm>
           <a:prstGeom prst="rect">
             <a:avLst/>
@@ -5164,7 +5212,133 @@
                 <a:latin typeface="Arial" panose="020B0604020202020204" pitchFamily="34" charset="0"/>
                 <a:cs typeface="Arial" panose="020B0604020202020204" pitchFamily="34" charset="0"/>
               </a:rPr>
-              <a:t>Length over time</a:t>
+              <a:t>Reproductive output limited to 30% of structural mass</a:t>
+            </a:r>
+          </a:p>
+        </p:txBody>
+      </p:sp>
+      <p:sp>
+        <p:nvSpPr>
+          <p:cNvPr id="5" name="TextBox 4">
+            <a:extLst>
+              <a:ext uri="{FF2B5EF4-FFF2-40B4-BE49-F238E27FC236}">
+                <a16:creationId xmlns:a16="http://schemas.microsoft.com/office/drawing/2014/main" id="{2EE64A17-C00C-E040-AC11-5C8A074E5033}"/>
+              </a:ext>
+            </a:extLst>
+          </p:cNvPr>
+          <p:cNvSpPr txBox="1"/>
+          <p:nvPr/>
+        </p:nvSpPr>
+        <p:spPr>
+          <a:xfrm rot="16200000">
+            <a:off x="-1056589" y="3206170"/>
+            <a:ext cx="2889738" cy="307777"/>
+          </a:xfrm>
+          <a:prstGeom prst="rect">
+            <a:avLst/>
+          </a:prstGeom>
+          <a:noFill/>
+        </p:spPr>
+        <p:txBody>
+          <a:bodyPr wrap="square" rtlCol="0">
+            <a:spAutoFit/>
+          </a:bodyPr>
+          <a:lstStyle/>
+          <a:p>
+            <a:pPr algn="ctr"/>
+            <a:r>
+              <a:rPr lang="en-US" sz="1400" b="1" dirty="0">
+                <a:solidFill>
+                  <a:srgbClr val="374BC1"/>
+                </a:solidFill>
+                <a:latin typeface="Arial" panose="020B0604020202020204" pitchFamily="34" charset="0"/>
+                <a:cs typeface="Arial" panose="020B0604020202020204" pitchFamily="34" charset="0"/>
+              </a:rPr>
+              <a:t>Low food</a:t>
+            </a:r>
+          </a:p>
+        </p:txBody>
+      </p:sp>
+      <p:sp>
+        <p:nvSpPr>
+          <p:cNvPr id="6" name="TextBox 5">
+            <a:extLst>
+              <a:ext uri="{FF2B5EF4-FFF2-40B4-BE49-F238E27FC236}">
+                <a16:creationId xmlns:a16="http://schemas.microsoft.com/office/drawing/2014/main" id="{27386780-ACF3-3F40-B8F3-A8860ABEAB0D}"/>
+              </a:ext>
+            </a:extLst>
+          </p:cNvPr>
+          <p:cNvSpPr txBox="1"/>
+          <p:nvPr/>
+        </p:nvSpPr>
+        <p:spPr>
+          <a:xfrm rot="16200000">
+            <a:off x="-984774" y="6406572"/>
+            <a:ext cx="2889738" cy="307777"/>
+          </a:xfrm>
+          <a:prstGeom prst="rect">
+            <a:avLst/>
+          </a:prstGeom>
+          <a:noFill/>
+        </p:spPr>
+        <p:txBody>
+          <a:bodyPr wrap="square" rtlCol="0">
+            <a:spAutoFit/>
+          </a:bodyPr>
+          <a:lstStyle/>
+          <a:p>
+            <a:pPr algn="ctr"/>
+            <a:r>
+              <a:rPr lang="en-US" sz="1400" b="1" dirty="0">
+                <a:solidFill>
+                  <a:srgbClr val="374BC1"/>
+                </a:solidFill>
+                <a:latin typeface="Arial" panose="020B0604020202020204" pitchFamily="34" charset="0"/>
+                <a:cs typeface="Arial" panose="020B0604020202020204" pitchFamily="34" charset="0"/>
+              </a:rPr>
+              <a:t>High food</a:t>
+            </a:r>
+          </a:p>
+        </p:txBody>
+      </p:sp>
+      <p:sp>
+        <p:nvSpPr>
+          <p:cNvPr id="7" name="TextBox 6">
+            <a:extLst>
+              <a:ext uri="{FF2B5EF4-FFF2-40B4-BE49-F238E27FC236}">
+                <a16:creationId xmlns:a16="http://schemas.microsoft.com/office/drawing/2014/main" id="{27EB423C-6585-7347-BC6C-6225E2FD59CD}"/>
+              </a:ext>
+            </a:extLst>
+          </p:cNvPr>
+          <p:cNvSpPr txBox="1"/>
+          <p:nvPr/>
+        </p:nvSpPr>
+        <p:spPr>
+          <a:xfrm>
+            <a:off x="1230921" y="668215"/>
+            <a:ext cx="5685693" cy="369332"/>
+          </a:xfrm>
+          <a:prstGeom prst="rect">
+            <a:avLst/>
+          </a:prstGeom>
+          <a:noFill/>
+        </p:spPr>
+        <p:txBody>
+          <a:bodyPr wrap="square" rtlCol="0">
+            <a:spAutoFit/>
+          </a:bodyPr>
+          <a:lstStyle/>
+          <a:p>
+            <a:pPr algn="ctr"/>
+            <a:r>
+              <a:rPr lang="en-US" b="1" dirty="0">
+                <a:solidFill>
+                  <a:srgbClr val="374BC1"/>
+                </a:solidFill>
+                <a:latin typeface="Arial" panose="020B0604020202020204" pitchFamily="34" charset="0"/>
+                <a:cs typeface="Arial" panose="020B0604020202020204" pitchFamily="34" charset="0"/>
+              </a:rPr>
+              <a:t>Reproductive limit sensitivity: REPRODUCTION</a:t>
             </a:r>
           </a:p>
         </p:txBody>
@@ -5172,7 +5346,7 @@
     </p:spTree>
     <p:extLst>
       <p:ext uri="{BB962C8B-B14F-4D97-AF65-F5344CB8AC3E}">
-        <p14:creationId xmlns:p14="http://schemas.microsoft.com/office/powerpoint/2010/main" val="2883174855"/>
+        <p14:creationId xmlns:p14="http://schemas.microsoft.com/office/powerpoint/2010/main" val="3136832274"/>
       </p:ext>
     </p:extLst>
   </p:cSld>
@@ -5183,6 +5357,546 @@
 </file>
 
 <file path=ppt/slides/slide7.xml><?xml version="1.0" encoding="utf-8"?>
+<p:sld xmlns:a="http://schemas.openxmlformats.org/drawingml/2006/main" xmlns:r="http://schemas.openxmlformats.org/officeDocument/2006/relationships" xmlns:p="http://schemas.openxmlformats.org/presentationml/2006/main">
+  <p:cSld>
+    <p:spTree>
+      <p:nvGrpSpPr>
+        <p:cNvPr id="1" name=""/>
+        <p:cNvGrpSpPr/>
+        <p:nvPr/>
+      </p:nvGrpSpPr>
+      <p:grpSpPr>
+        <a:xfrm>
+          <a:off x="0" y="0"/>
+          <a:ext cx="0" cy="0"/>
+          <a:chOff x="0" y="0"/>
+          <a:chExt cx="0" cy="0"/>
+        </a:xfrm>
+      </p:grpSpPr>
+      <p:pic>
+        <p:nvPicPr>
+          <p:cNvPr id="2" name="Picture 1">
+            <a:extLst>
+              <a:ext uri="{FF2B5EF4-FFF2-40B4-BE49-F238E27FC236}">
+                <a16:creationId xmlns:a16="http://schemas.microsoft.com/office/drawing/2014/main" id="{A93BF9D1-C341-1943-8F56-2345667868DB}"/>
+              </a:ext>
+            </a:extLst>
+          </p:cNvPr>
+          <p:cNvPicPr>
+            <a:picLocks noChangeAspect="1"/>
+          </p:cNvPicPr>
+          <p:nvPr/>
+        </p:nvPicPr>
+        <p:blipFill>
+          <a:blip r:embed="rId2"/>
+          <a:stretch>
+            <a:fillRect/>
+          </a:stretch>
+        </p:blipFill>
+        <p:spPr>
+          <a:xfrm>
+            <a:off x="685800" y="1828800"/>
+            <a:ext cx="6400800" cy="6400800"/>
+          </a:xfrm>
+          <a:prstGeom prst="rect">
+            <a:avLst/>
+          </a:prstGeom>
+        </p:spPr>
+      </p:pic>
+      <p:sp>
+        <p:nvSpPr>
+          <p:cNvPr id="3" name="TextBox 2">
+            <a:extLst>
+              <a:ext uri="{FF2B5EF4-FFF2-40B4-BE49-F238E27FC236}">
+                <a16:creationId xmlns:a16="http://schemas.microsoft.com/office/drawing/2014/main" id="{53204E7C-F455-524D-A0FA-2CE6F899129C}"/>
+              </a:ext>
+            </a:extLst>
+          </p:cNvPr>
+          <p:cNvSpPr txBox="1"/>
+          <p:nvPr/>
+        </p:nvSpPr>
+        <p:spPr>
+          <a:xfrm>
+            <a:off x="996462" y="1518046"/>
+            <a:ext cx="2889738" cy="523220"/>
+          </a:xfrm>
+          <a:prstGeom prst="rect">
+            <a:avLst/>
+          </a:prstGeom>
+          <a:noFill/>
+        </p:spPr>
+        <p:txBody>
+          <a:bodyPr wrap="square" rtlCol="0">
+            <a:spAutoFit/>
+          </a:bodyPr>
+          <a:lstStyle/>
+          <a:p>
+            <a:pPr algn="ctr"/>
+            <a:r>
+              <a:rPr lang="en-US" sz="1400" b="1" dirty="0">
+                <a:solidFill>
+                  <a:srgbClr val="374BC1"/>
+                </a:solidFill>
+                <a:latin typeface="Arial" panose="020B0604020202020204" pitchFamily="34" charset="0"/>
+                <a:cs typeface="Arial" panose="020B0604020202020204" pitchFamily="34" charset="0"/>
+              </a:rPr>
+              <a:t>Reproductive output limited to 20% of structural mass</a:t>
+            </a:r>
+          </a:p>
+        </p:txBody>
+      </p:sp>
+      <p:sp>
+        <p:nvSpPr>
+          <p:cNvPr id="4" name="TextBox 3">
+            <a:extLst>
+              <a:ext uri="{FF2B5EF4-FFF2-40B4-BE49-F238E27FC236}">
+                <a16:creationId xmlns:a16="http://schemas.microsoft.com/office/drawing/2014/main" id="{29DB4243-680F-BB47-9743-6C187F492414}"/>
+              </a:ext>
+            </a:extLst>
+          </p:cNvPr>
+          <p:cNvSpPr txBox="1"/>
+          <p:nvPr/>
+        </p:nvSpPr>
+        <p:spPr>
+          <a:xfrm>
+            <a:off x="4352193" y="1541492"/>
+            <a:ext cx="2889738" cy="523220"/>
+          </a:xfrm>
+          <a:prstGeom prst="rect">
+            <a:avLst/>
+          </a:prstGeom>
+          <a:noFill/>
+        </p:spPr>
+        <p:txBody>
+          <a:bodyPr wrap="square" rtlCol="0">
+            <a:spAutoFit/>
+          </a:bodyPr>
+          <a:lstStyle/>
+          <a:p>
+            <a:pPr algn="ctr"/>
+            <a:r>
+              <a:rPr lang="en-US" sz="1400" b="1" dirty="0">
+                <a:solidFill>
+                  <a:srgbClr val="374BC1"/>
+                </a:solidFill>
+                <a:latin typeface="Arial" panose="020B0604020202020204" pitchFamily="34" charset="0"/>
+                <a:cs typeface="Arial" panose="020B0604020202020204" pitchFamily="34" charset="0"/>
+              </a:rPr>
+              <a:t>Reproductive output limited to 30% of structural mass</a:t>
+            </a:r>
+          </a:p>
+        </p:txBody>
+      </p:sp>
+      <p:sp>
+        <p:nvSpPr>
+          <p:cNvPr id="5" name="TextBox 4">
+            <a:extLst>
+              <a:ext uri="{FF2B5EF4-FFF2-40B4-BE49-F238E27FC236}">
+                <a16:creationId xmlns:a16="http://schemas.microsoft.com/office/drawing/2014/main" id="{57EFA0EE-2938-574F-B05C-7DFCA97B234E}"/>
+              </a:ext>
+            </a:extLst>
+          </p:cNvPr>
+          <p:cNvSpPr txBox="1"/>
+          <p:nvPr/>
+        </p:nvSpPr>
+        <p:spPr>
+          <a:xfrm rot="16200000">
+            <a:off x="-1056589" y="3206170"/>
+            <a:ext cx="2889738" cy="307777"/>
+          </a:xfrm>
+          <a:prstGeom prst="rect">
+            <a:avLst/>
+          </a:prstGeom>
+          <a:noFill/>
+        </p:spPr>
+        <p:txBody>
+          <a:bodyPr wrap="square" rtlCol="0">
+            <a:spAutoFit/>
+          </a:bodyPr>
+          <a:lstStyle/>
+          <a:p>
+            <a:pPr algn="ctr"/>
+            <a:r>
+              <a:rPr lang="en-US" sz="1400" b="1" dirty="0">
+                <a:solidFill>
+                  <a:srgbClr val="374BC1"/>
+                </a:solidFill>
+                <a:latin typeface="Arial" panose="020B0604020202020204" pitchFamily="34" charset="0"/>
+                <a:cs typeface="Arial" panose="020B0604020202020204" pitchFamily="34" charset="0"/>
+              </a:rPr>
+              <a:t>Low food</a:t>
+            </a:r>
+          </a:p>
+        </p:txBody>
+      </p:sp>
+      <p:sp>
+        <p:nvSpPr>
+          <p:cNvPr id="6" name="TextBox 5">
+            <a:extLst>
+              <a:ext uri="{FF2B5EF4-FFF2-40B4-BE49-F238E27FC236}">
+                <a16:creationId xmlns:a16="http://schemas.microsoft.com/office/drawing/2014/main" id="{1BD88CDA-A422-7547-9D88-11F44B7D75F1}"/>
+              </a:ext>
+            </a:extLst>
+          </p:cNvPr>
+          <p:cNvSpPr txBox="1"/>
+          <p:nvPr/>
+        </p:nvSpPr>
+        <p:spPr>
+          <a:xfrm rot="16200000">
+            <a:off x="-984774" y="6406572"/>
+            <a:ext cx="2889738" cy="307777"/>
+          </a:xfrm>
+          <a:prstGeom prst="rect">
+            <a:avLst/>
+          </a:prstGeom>
+          <a:noFill/>
+        </p:spPr>
+        <p:txBody>
+          <a:bodyPr wrap="square" rtlCol="0">
+            <a:spAutoFit/>
+          </a:bodyPr>
+          <a:lstStyle/>
+          <a:p>
+            <a:pPr algn="ctr"/>
+            <a:r>
+              <a:rPr lang="en-US" sz="1400" b="1" dirty="0">
+                <a:solidFill>
+                  <a:srgbClr val="374BC1"/>
+                </a:solidFill>
+                <a:latin typeface="Arial" panose="020B0604020202020204" pitchFamily="34" charset="0"/>
+                <a:cs typeface="Arial" panose="020B0604020202020204" pitchFamily="34" charset="0"/>
+              </a:rPr>
+              <a:t>High food</a:t>
+            </a:r>
+          </a:p>
+        </p:txBody>
+      </p:sp>
+      <p:sp>
+        <p:nvSpPr>
+          <p:cNvPr id="7" name="TextBox 6">
+            <a:extLst>
+              <a:ext uri="{FF2B5EF4-FFF2-40B4-BE49-F238E27FC236}">
+                <a16:creationId xmlns:a16="http://schemas.microsoft.com/office/drawing/2014/main" id="{A82F6B3C-4CC3-2846-BF38-57A7DD47DF57}"/>
+              </a:ext>
+            </a:extLst>
+          </p:cNvPr>
+          <p:cNvSpPr txBox="1"/>
+          <p:nvPr/>
+        </p:nvSpPr>
+        <p:spPr>
+          <a:xfrm>
+            <a:off x="996462" y="808671"/>
+            <a:ext cx="6189787" cy="369332"/>
+          </a:xfrm>
+          <a:prstGeom prst="rect">
+            <a:avLst/>
+          </a:prstGeom>
+          <a:noFill/>
+        </p:spPr>
+        <p:txBody>
+          <a:bodyPr wrap="square" rtlCol="0">
+            <a:spAutoFit/>
+          </a:bodyPr>
+          <a:lstStyle/>
+          <a:p>
+            <a:pPr algn="ctr"/>
+            <a:r>
+              <a:rPr lang="en-US" b="1" dirty="0">
+                <a:solidFill>
+                  <a:srgbClr val="374BC1"/>
+                </a:solidFill>
+                <a:latin typeface="Arial" panose="020B0604020202020204" pitchFamily="34" charset="0"/>
+                <a:cs typeface="Arial" panose="020B0604020202020204" pitchFamily="34" charset="0"/>
+              </a:rPr>
+              <a:t>Reproductive limit sensitivity: FECUNDITY EXPONENT</a:t>
+            </a:r>
+          </a:p>
+        </p:txBody>
+      </p:sp>
+    </p:spTree>
+    <p:extLst>
+      <p:ext uri="{BB962C8B-B14F-4D97-AF65-F5344CB8AC3E}">
+        <p14:creationId xmlns:p14="http://schemas.microsoft.com/office/powerpoint/2010/main" val="3858828727"/>
+      </p:ext>
+    </p:extLst>
+  </p:cSld>
+  <p:clrMapOvr>
+    <a:masterClrMapping/>
+  </p:clrMapOvr>
+</p:sld>
+</file>
+
+<file path=ppt/slides/slide8.xml><?xml version="1.0" encoding="utf-8"?>
+<p:sld xmlns:a="http://schemas.openxmlformats.org/drawingml/2006/main" xmlns:r="http://schemas.openxmlformats.org/officeDocument/2006/relationships" xmlns:p="http://schemas.openxmlformats.org/presentationml/2006/main">
+  <p:cSld>
+    <p:spTree>
+      <p:nvGrpSpPr>
+        <p:cNvPr id="1" name=""/>
+        <p:cNvGrpSpPr/>
+        <p:nvPr/>
+      </p:nvGrpSpPr>
+      <p:grpSpPr>
+        <a:xfrm>
+          <a:off x="0" y="0"/>
+          <a:ext cx="0" cy="0"/>
+          <a:chOff x="0" y="0"/>
+          <a:chExt cx="0" cy="0"/>
+        </a:xfrm>
+      </p:grpSpPr>
+      <p:pic>
+        <p:nvPicPr>
+          <p:cNvPr id="2" name="Picture 1">
+            <a:extLst>
+              <a:ext uri="{FF2B5EF4-FFF2-40B4-BE49-F238E27FC236}">
+                <a16:creationId xmlns:a16="http://schemas.microsoft.com/office/drawing/2014/main" id="{E8D6CA2B-700E-C148-970A-3E9539121857}"/>
+              </a:ext>
+            </a:extLst>
+          </p:cNvPr>
+          <p:cNvPicPr>
+            <a:picLocks noChangeAspect="1"/>
+          </p:cNvPicPr>
+          <p:nvPr/>
+        </p:nvPicPr>
+        <p:blipFill>
+          <a:blip r:embed="rId2"/>
+          <a:stretch>
+            <a:fillRect/>
+          </a:stretch>
+        </p:blipFill>
+        <p:spPr>
+          <a:xfrm>
+            <a:off x="685800" y="1828800"/>
+            <a:ext cx="6400800" cy="6400800"/>
+          </a:xfrm>
+          <a:prstGeom prst="rect">
+            <a:avLst/>
+          </a:prstGeom>
+        </p:spPr>
+      </p:pic>
+      <p:sp>
+        <p:nvSpPr>
+          <p:cNvPr id="3" name="TextBox 2">
+            <a:extLst>
+              <a:ext uri="{FF2B5EF4-FFF2-40B4-BE49-F238E27FC236}">
+                <a16:creationId xmlns:a16="http://schemas.microsoft.com/office/drawing/2014/main" id="{220DD022-A6D9-A949-B785-BA08D7A4A30B}"/>
+              </a:ext>
+            </a:extLst>
+          </p:cNvPr>
+          <p:cNvSpPr txBox="1"/>
+          <p:nvPr/>
+        </p:nvSpPr>
+        <p:spPr>
+          <a:xfrm>
+            <a:off x="996462" y="1518046"/>
+            <a:ext cx="2889738" cy="523220"/>
+          </a:xfrm>
+          <a:prstGeom prst="rect">
+            <a:avLst/>
+          </a:prstGeom>
+          <a:noFill/>
+        </p:spPr>
+        <p:txBody>
+          <a:bodyPr wrap="square" rtlCol="0">
+            <a:spAutoFit/>
+          </a:bodyPr>
+          <a:lstStyle/>
+          <a:p>
+            <a:pPr algn="ctr"/>
+            <a:r>
+              <a:rPr lang="en-US" sz="1400" b="1" dirty="0">
+                <a:solidFill>
+                  <a:srgbClr val="374BC1"/>
+                </a:solidFill>
+                <a:latin typeface="Arial" panose="020B0604020202020204" pitchFamily="34" charset="0"/>
+                <a:cs typeface="Arial" panose="020B0604020202020204" pitchFamily="34" charset="0"/>
+              </a:rPr>
+              <a:t>Reproductive output limited to 20% of structural mass</a:t>
+            </a:r>
+          </a:p>
+        </p:txBody>
+      </p:sp>
+      <p:sp>
+        <p:nvSpPr>
+          <p:cNvPr id="4" name="TextBox 3">
+            <a:extLst>
+              <a:ext uri="{FF2B5EF4-FFF2-40B4-BE49-F238E27FC236}">
+                <a16:creationId xmlns:a16="http://schemas.microsoft.com/office/drawing/2014/main" id="{9FF56A60-0672-324E-AEC6-6AD86CD021E2}"/>
+              </a:ext>
+            </a:extLst>
+          </p:cNvPr>
+          <p:cNvSpPr txBox="1"/>
+          <p:nvPr/>
+        </p:nvSpPr>
+        <p:spPr>
+          <a:xfrm>
+            <a:off x="4352193" y="1541492"/>
+            <a:ext cx="2889738" cy="523220"/>
+          </a:xfrm>
+          <a:prstGeom prst="rect">
+            <a:avLst/>
+          </a:prstGeom>
+          <a:noFill/>
+        </p:spPr>
+        <p:txBody>
+          <a:bodyPr wrap="square" rtlCol="0">
+            <a:spAutoFit/>
+          </a:bodyPr>
+          <a:lstStyle/>
+          <a:p>
+            <a:pPr algn="ctr"/>
+            <a:r>
+              <a:rPr lang="en-US" sz="1400" b="1" dirty="0">
+                <a:solidFill>
+                  <a:srgbClr val="374BC1"/>
+                </a:solidFill>
+                <a:latin typeface="Arial" panose="020B0604020202020204" pitchFamily="34" charset="0"/>
+                <a:cs typeface="Arial" panose="020B0604020202020204" pitchFamily="34" charset="0"/>
+              </a:rPr>
+              <a:t>Reproductive output limited to 30% of structural mass</a:t>
+            </a:r>
+          </a:p>
+        </p:txBody>
+      </p:sp>
+      <p:sp>
+        <p:nvSpPr>
+          <p:cNvPr id="5" name="TextBox 4">
+            <a:extLst>
+              <a:ext uri="{FF2B5EF4-FFF2-40B4-BE49-F238E27FC236}">
+                <a16:creationId xmlns:a16="http://schemas.microsoft.com/office/drawing/2014/main" id="{CA0039F0-45A8-7C49-9975-39C09AA0E110}"/>
+              </a:ext>
+            </a:extLst>
+          </p:cNvPr>
+          <p:cNvSpPr txBox="1"/>
+          <p:nvPr/>
+        </p:nvSpPr>
+        <p:spPr>
+          <a:xfrm rot="16200000">
+            <a:off x="-1056589" y="3206170"/>
+            <a:ext cx="2889738" cy="307777"/>
+          </a:xfrm>
+          <a:prstGeom prst="rect">
+            <a:avLst/>
+          </a:prstGeom>
+          <a:noFill/>
+        </p:spPr>
+        <p:txBody>
+          <a:bodyPr wrap="square" rtlCol="0">
+            <a:spAutoFit/>
+          </a:bodyPr>
+          <a:lstStyle/>
+          <a:p>
+            <a:pPr algn="ctr"/>
+            <a:r>
+              <a:rPr lang="en-US" sz="1400" b="1" dirty="0">
+                <a:solidFill>
+                  <a:srgbClr val="374BC1"/>
+                </a:solidFill>
+                <a:latin typeface="Arial" panose="020B0604020202020204" pitchFamily="34" charset="0"/>
+                <a:cs typeface="Arial" panose="020B0604020202020204" pitchFamily="34" charset="0"/>
+              </a:rPr>
+              <a:t>Low food</a:t>
+            </a:r>
+          </a:p>
+        </p:txBody>
+      </p:sp>
+      <p:sp>
+        <p:nvSpPr>
+          <p:cNvPr id="6" name="TextBox 5">
+            <a:extLst>
+              <a:ext uri="{FF2B5EF4-FFF2-40B4-BE49-F238E27FC236}">
+                <a16:creationId xmlns:a16="http://schemas.microsoft.com/office/drawing/2014/main" id="{5108A8ED-43E8-724F-AA37-E6AFBD63A2B4}"/>
+              </a:ext>
+            </a:extLst>
+          </p:cNvPr>
+          <p:cNvSpPr txBox="1"/>
+          <p:nvPr/>
+        </p:nvSpPr>
+        <p:spPr>
+          <a:xfrm rot="16200000">
+            <a:off x="-984774" y="6406572"/>
+            <a:ext cx="2889738" cy="307777"/>
+          </a:xfrm>
+          <a:prstGeom prst="rect">
+            <a:avLst/>
+          </a:prstGeom>
+          <a:noFill/>
+        </p:spPr>
+        <p:txBody>
+          <a:bodyPr wrap="square" rtlCol="0">
+            <a:spAutoFit/>
+          </a:bodyPr>
+          <a:lstStyle/>
+          <a:p>
+            <a:pPr algn="ctr"/>
+            <a:r>
+              <a:rPr lang="en-US" sz="1400" b="1" dirty="0">
+                <a:solidFill>
+                  <a:srgbClr val="374BC1"/>
+                </a:solidFill>
+                <a:latin typeface="Arial" panose="020B0604020202020204" pitchFamily="34" charset="0"/>
+                <a:cs typeface="Arial" panose="020B0604020202020204" pitchFamily="34" charset="0"/>
+              </a:rPr>
+              <a:t>High food</a:t>
+            </a:r>
+          </a:p>
+        </p:txBody>
+      </p:sp>
+      <p:sp>
+        <p:nvSpPr>
+          <p:cNvPr id="7" name="TextBox 6">
+            <a:extLst>
+              <a:ext uri="{FF2B5EF4-FFF2-40B4-BE49-F238E27FC236}">
+                <a16:creationId xmlns:a16="http://schemas.microsoft.com/office/drawing/2014/main" id="{D2544E85-02C7-144B-BDA8-BF6C8665A009}"/>
+              </a:ext>
+            </a:extLst>
+          </p:cNvPr>
+          <p:cNvSpPr txBox="1"/>
+          <p:nvPr/>
+        </p:nvSpPr>
+        <p:spPr>
+          <a:xfrm>
+            <a:off x="996462" y="808671"/>
+            <a:ext cx="6189787" cy="369332"/>
+          </a:xfrm>
+          <a:prstGeom prst="rect">
+            <a:avLst/>
+          </a:prstGeom>
+          <a:noFill/>
+        </p:spPr>
+        <p:txBody>
+          <a:bodyPr wrap="square" rtlCol="0">
+            <a:spAutoFit/>
+          </a:bodyPr>
+          <a:lstStyle/>
+          <a:p>
+            <a:pPr algn="ctr"/>
+            <a:r>
+              <a:rPr lang="en-US" b="1" dirty="0">
+                <a:solidFill>
+                  <a:srgbClr val="374BC1"/>
+                </a:solidFill>
+                <a:latin typeface="Arial" panose="020B0604020202020204" pitchFamily="34" charset="0"/>
+                <a:cs typeface="Arial" panose="020B0604020202020204" pitchFamily="34" charset="0"/>
+              </a:rPr>
+              <a:t>Reproductive limit sensitivity: MORTALITY SLOPE</a:t>
+            </a:r>
+          </a:p>
+        </p:txBody>
+      </p:sp>
+    </p:spTree>
+    <p:extLst>
+      <p:ext uri="{BB962C8B-B14F-4D97-AF65-F5344CB8AC3E}">
+        <p14:creationId xmlns:p14="http://schemas.microsoft.com/office/powerpoint/2010/main" val="928058916"/>
+      </p:ext>
+    </p:extLst>
+  </p:cSld>
+  <p:clrMapOvr>
+    <a:masterClrMapping/>
+  </p:clrMapOvr>
+</p:sld>
+</file>
+
+<file path=ppt/slides/slide9.xml><?xml version="1.0" encoding="utf-8"?>
 <p:sld xmlns:a="http://schemas.openxmlformats.org/drawingml/2006/main" xmlns:r="http://schemas.openxmlformats.org/officeDocument/2006/relationships" xmlns:p="http://schemas.openxmlformats.org/presentationml/2006/main">
   <p:cSld>
     <p:spTree>
@@ -5259,16 +5973,6 @@
           <a:p>
             <a:pPr algn="ctr"/>
             <a:r>
-              <a:rPr lang="en-US" sz="1100" b="1" dirty="0" err="1">
-                <a:solidFill>
-                  <a:srgbClr val="374BC1"/>
-                </a:solidFill>
-                <a:latin typeface="Arial" panose="020B0604020202020204" pitchFamily="34" charset="0"/>
-                <a:cs typeface="Arial" panose="020B0604020202020204" pitchFamily="34" charset="0"/>
-              </a:rPr>
-              <a:t>Tmax</a:t>
-            </a:r>
-            <a:r>
               <a:rPr lang="en-US" sz="1100" b="1" dirty="0">
                 <a:solidFill>
                   <a:srgbClr val="374BC1"/>
@@ -5276,7 +5980,7 @@
                 <a:latin typeface="Arial" panose="020B0604020202020204" pitchFamily="34" charset="0"/>
                 <a:cs typeface="Arial" panose="020B0604020202020204" pitchFamily="34" charset="0"/>
               </a:rPr>
-              <a:t> is 15</a:t>
+              <a:t>T is 15</a:t>
             </a:r>
           </a:p>
         </p:txBody>
@@ -5303,7 +6007,7 @@
         </p:blipFill>
         <p:spPr>
           <a:xfrm>
-            <a:off x="2514685" y="1019089"/>
+            <a:off x="2549939" y="1019089"/>
             <a:ext cx="2819400" cy="6273800"/>
           </a:xfrm>
           <a:prstGeom prst="rect">
@@ -5341,16 +6045,6 @@
           <a:p>
             <a:pPr algn="ctr"/>
             <a:r>
-              <a:rPr lang="en-US" sz="1100" b="1" dirty="0" err="1">
-                <a:solidFill>
-                  <a:srgbClr val="374BC1"/>
-                </a:solidFill>
-                <a:latin typeface="Arial" panose="020B0604020202020204" pitchFamily="34" charset="0"/>
-                <a:cs typeface="Arial" panose="020B0604020202020204" pitchFamily="34" charset="0"/>
-              </a:rPr>
-              <a:t>Tmax</a:t>
-            </a:r>
-            <a:r>
               <a:rPr lang="en-US" sz="1100" b="1" dirty="0">
                 <a:solidFill>
                   <a:srgbClr val="374BC1"/>
@@ -5358,7 +6052,7 @@
                 <a:latin typeface="Arial" panose="020B0604020202020204" pitchFamily="34" charset="0"/>
                 <a:cs typeface="Arial" panose="020B0604020202020204" pitchFamily="34" charset="0"/>
               </a:rPr>
-              <a:t> is 18</a:t>
+              <a:t>T  is 18</a:t>
             </a:r>
           </a:p>
         </p:txBody>
@@ -5423,16 +6117,6 @@
           <a:p>
             <a:pPr algn="ctr"/>
             <a:r>
-              <a:rPr lang="en-US" sz="1100" b="1" dirty="0" err="1">
-                <a:solidFill>
-                  <a:srgbClr val="374BC1"/>
-                </a:solidFill>
-                <a:latin typeface="Arial" panose="020B0604020202020204" pitchFamily="34" charset="0"/>
-                <a:cs typeface="Arial" panose="020B0604020202020204" pitchFamily="34" charset="0"/>
-              </a:rPr>
-              <a:t>Tmax</a:t>
-            </a:r>
-            <a:r>
               <a:rPr lang="en-US" sz="1100" b="1" dirty="0">
                 <a:solidFill>
                   <a:srgbClr val="374BC1"/>
@@ -5440,7 +6124,133 @@
                 <a:latin typeface="Arial" panose="020B0604020202020204" pitchFamily="34" charset="0"/>
                 <a:cs typeface="Arial" panose="020B0604020202020204" pitchFamily="34" charset="0"/>
               </a:rPr>
-              <a:t> is 30</a:t>
+              <a:t>T  is 30</a:t>
+            </a:r>
+          </a:p>
+        </p:txBody>
+      </p:sp>
+      <p:sp>
+        <p:nvSpPr>
+          <p:cNvPr id="8" name="TextBox 7">
+            <a:extLst>
+              <a:ext uri="{FF2B5EF4-FFF2-40B4-BE49-F238E27FC236}">
+                <a16:creationId xmlns:a16="http://schemas.microsoft.com/office/drawing/2014/main" id="{F0CBC13D-003A-154F-A554-CC58C1E2DD1B}"/>
+              </a:ext>
+            </a:extLst>
+          </p:cNvPr>
+          <p:cNvSpPr txBox="1"/>
+          <p:nvPr/>
+        </p:nvSpPr>
+        <p:spPr>
+          <a:xfrm>
+            <a:off x="2549939" y="93132"/>
+            <a:ext cx="3221407" cy="338554"/>
+          </a:xfrm>
+          <a:prstGeom prst="rect">
+            <a:avLst/>
+          </a:prstGeom>
+          <a:noFill/>
+        </p:spPr>
+        <p:txBody>
+          <a:bodyPr wrap="square" rtlCol="0">
+            <a:spAutoFit/>
+          </a:bodyPr>
+          <a:lstStyle/>
+          <a:p>
+            <a:pPr algn="l"/>
+            <a:r>
+              <a:rPr lang="en-US" sz="1600" b="1" dirty="0">
+                <a:solidFill>
+                  <a:srgbClr val="374BC1"/>
+                </a:solidFill>
+                <a:latin typeface="Arial" panose="020B0604020202020204" pitchFamily="34" charset="0"/>
+                <a:cs typeface="Arial" panose="020B0604020202020204" pitchFamily="34" charset="0"/>
+              </a:rPr>
+              <a:t>TIME HORIZON SENSITIVITY</a:t>
+            </a:r>
+          </a:p>
+        </p:txBody>
+      </p:sp>
+      <p:sp>
+        <p:nvSpPr>
+          <p:cNvPr id="9" name="TextBox 8">
+            <a:extLst>
+              <a:ext uri="{FF2B5EF4-FFF2-40B4-BE49-F238E27FC236}">
+                <a16:creationId xmlns:a16="http://schemas.microsoft.com/office/drawing/2014/main" id="{F13AFA99-4AC7-014B-9DBF-E05CC387F90D}"/>
+              </a:ext>
+            </a:extLst>
+          </p:cNvPr>
+          <p:cNvSpPr txBox="1"/>
+          <p:nvPr/>
+        </p:nvSpPr>
+        <p:spPr>
+          <a:xfrm>
+            <a:off x="-45825" y="1215195"/>
+            <a:ext cx="3221407" cy="261610"/>
+          </a:xfrm>
+          <a:prstGeom prst="rect">
+            <a:avLst/>
+          </a:prstGeom>
+          <a:noFill/>
+        </p:spPr>
+        <p:txBody>
+          <a:bodyPr wrap="square" rtlCol="0">
+            <a:spAutoFit/>
+          </a:bodyPr>
+          <a:lstStyle/>
+          <a:p>
+            <a:pPr algn="l"/>
+            <a:r>
+              <a:rPr lang="en-US" sz="1050" b="1" dirty="0">
+                <a:solidFill>
+                  <a:srgbClr val="374BC1"/>
+                </a:solidFill>
+                <a:latin typeface="Arial" panose="020B0604020202020204" pitchFamily="34" charset="0"/>
+                <a:cs typeface="Arial" panose="020B0604020202020204" pitchFamily="34" charset="0"/>
+              </a:rPr>
+              <a:t>Low food</a:t>
+            </a:r>
+          </a:p>
+        </p:txBody>
+      </p:sp>
+      <p:sp>
+        <p:nvSpPr>
+          <p:cNvPr id="10" name="TextBox 9">
+            <a:extLst>
+              <a:ext uri="{FF2B5EF4-FFF2-40B4-BE49-F238E27FC236}">
+                <a16:creationId xmlns:a16="http://schemas.microsoft.com/office/drawing/2014/main" id="{AC3199CA-A934-8F44-B9FC-D322B7D727C8}"/>
+              </a:ext>
+            </a:extLst>
+          </p:cNvPr>
+          <p:cNvSpPr txBox="1"/>
+          <p:nvPr/>
+        </p:nvSpPr>
+        <p:spPr>
+          <a:xfrm>
+            <a:off x="29393" y="3221795"/>
+            <a:ext cx="3221407" cy="261610"/>
+          </a:xfrm>
+          <a:prstGeom prst="rect">
+            <a:avLst/>
+          </a:prstGeom>
+          <a:noFill/>
+        </p:spPr>
+        <p:txBody>
+          <a:bodyPr wrap="square" rtlCol="0">
+            <a:spAutoFit/>
+          </a:bodyPr>
+          <a:lstStyle/>
+          <a:p>
+            <a:pPr algn="l"/>
+            <a:r>
+              <a:rPr lang="en-US" sz="1050" b="1" dirty="0">
+                <a:solidFill>
+                  <a:srgbClr val="374BC1"/>
+                </a:solidFill>
+                <a:latin typeface="Arial" panose="020B0604020202020204" pitchFamily="34" charset="0"/>
+                <a:cs typeface="Arial" panose="020B0604020202020204" pitchFamily="34" charset="0"/>
+              </a:rPr>
+              <a:t>Hi food</a:t>
             </a:r>
           </a:p>
         </p:txBody>

</xml_diff>